<commit_message>
added future work to final presentation
</commit_message>
<xml_diff>
--- a/Folien/Abschlusssvortrag_Stefan_Effenberger.pptx
+++ b/Folien/Abschlusssvortrag_Stefan_Effenberger.pptx
@@ -5,10 +5,10 @@
     <p:sldMasterId id="2147483652" r:id="rId1"/>
   </p:sldMasterIdLst>
   <p:notesMasterIdLst>
-    <p:notesMasterId r:id="rId19"/>
+    <p:notesMasterId r:id="rId20"/>
   </p:notesMasterIdLst>
   <p:handoutMasterIdLst>
-    <p:handoutMasterId r:id="rId20"/>
+    <p:handoutMasterId r:id="rId21"/>
   </p:handoutMasterIdLst>
   <p:sldIdLst>
     <p:sldId id="836" r:id="rId2"/>
@@ -27,7 +27,8 @@
     <p:sldId id="857" r:id="rId15"/>
     <p:sldId id="858" r:id="rId16"/>
     <p:sldId id="859" r:id="rId17"/>
-    <p:sldId id="846" r:id="rId18"/>
+    <p:sldId id="860" r:id="rId18"/>
+    <p:sldId id="846" r:id="rId19"/>
   </p:sldIdLst>
   <p:sldSz cx="9144000" cy="6858000" type="screen4x3"/>
   <p:notesSz cx="6781800" cy="9855200"/>
@@ -158,7 +159,7 @@
   </p:defaultTextStyle>
   <p:extLst>
     <p:ext uri="{EFAFB233-063F-42B5-8137-9DF3F51BA10A}">
-      <p15:sldGuideLst xmlns:p15="http://schemas.microsoft.com/office/powerpoint/2012/main" xmlns="">
+      <p15:sldGuideLst xmlns="" xmlns:p15="http://schemas.microsoft.com/office/powerpoint/2012/main">
         <p15:guide id="1" orient="horz" pos="4042">
           <p15:clr>
             <a:srgbClr val="A4A3A4"/>
@@ -172,7 +173,7 @@
       </p15:sldGuideLst>
     </p:ext>
     <p:ext uri="{2D200454-40CA-4A62-9FC3-DE9A4176ACB9}">
-      <p15:notesGuideLst xmlns:p15="http://schemas.microsoft.com/office/powerpoint/2012/main" xmlns="">
+      <p15:notesGuideLst xmlns="" xmlns:p15="http://schemas.microsoft.com/office/powerpoint/2012/main">
         <p15:guide id="1" orient="horz" pos="3103">
           <p15:clr>
             <a:srgbClr val="A4A3A4"/>
@@ -345,7 +346,7 @@
             <a:fld id="{AE02961B-B228-4466-84E5-B65BB245109F}" type="datetimeFigureOut">
               <a:rPr lang="de-DE"/>
               <a:pPr/>
-              <a:t>14.05.2018</a:t>
+              <a:t>17.05.2018</a:t>
             </a:fld>
             <a:endParaRPr lang="de-DE"/>
           </a:p>
@@ -4033,13 +4034,8 @@
           <a:p>
             <a:r>
               <a:rPr lang="de-DE" dirty="0" smtClean="0"/>
-              <a:t>Evaluierung anhand von zwei elementaren Graph Algorithme</a:t>
-            </a:r>
-            <a:r>
-              <a:rPr lang="de-DE" dirty="0" smtClean="0"/>
-              <a:t>n:</a:t>
-            </a:r>
-            <a:endParaRPr lang="de-DE" dirty="0" smtClean="0"/>
+              <a:t>Evaluierung anhand von zwei elementaren Graph Algorithmen:</a:t>
+            </a:r>
           </a:p>
           <a:p>
             <a:pPr lvl="1"/>
@@ -4126,7 +4122,6 @@
               <a:rPr lang="de-DE" dirty="0" smtClean="0"/>
               <a:t> der Rechenkraft bei gleichbleibender Datenmenge</a:t>
             </a:r>
-            <a:endParaRPr lang="de-DE" dirty="0" smtClean="0"/>
           </a:p>
           <a:p>
             <a:r>
@@ -5182,9 +5177,14 @@
           <a:lstStyle/>
           <a:p>
             <a:r>
-              <a:rPr lang="de-DE" dirty="0"/>
-              <a:t>Quellen</a:t>
-            </a:r>
+              <a:rPr lang="de-DE" dirty="0" smtClean="0"/>
+              <a:t>Future </a:t>
+            </a:r>
+            <a:r>
+              <a:rPr lang="de-DE" dirty="0" err="1" smtClean="0"/>
+              <a:t>work</a:t>
+            </a:r>
+            <a:endParaRPr lang="de-DE" dirty="0"/>
           </a:p>
         </p:txBody>
       </p:sp>
@@ -5203,84 +5203,64 @@
           <a:bodyPr/>
           <a:lstStyle/>
           <a:p>
-            <a:pPr marL="0" indent="0">
-              <a:spcAft>
-                <a:spcPts val="1800"/>
-              </a:spcAft>
-              <a:buNone/>
-            </a:pPr>
-            <a:r>
-              <a:rPr lang="de-DE" sz="2000" dirty="0"/>
-              <a:t>[1] </a:t>
-            </a:r>
-            <a:r>
-              <a:rPr lang="de-DE" sz="2000" dirty="0">
-                <a:hlinkClick r:id="rId2"/>
-              </a:rPr>
-              <a:t>http://en.cppreference.com/w/cpp/concept/Container</a:t>
-            </a:r>
-            <a:endParaRPr lang="de-DE" sz="2000" dirty="0"/>
-          </a:p>
-          <a:p>
-            <a:pPr marL="0" indent="0">
-              <a:spcAft>
-                <a:spcPts val="1800"/>
-              </a:spcAft>
-              <a:buNone/>
-            </a:pPr>
-            <a:r>
-              <a:rPr lang="de-DE" sz="2000" dirty="0" smtClean="0"/>
-              <a:t>[</a:t>
-            </a:r>
-            <a:r>
-              <a:rPr lang="de-DE" sz="2000" dirty="0"/>
-              <a:t>2</a:t>
-            </a:r>
-            <a:r>
-              <a:rPr lang="de-DE" sz="2000" dirty="0" smtClean="0"/>
-              <a:t>] </a:t>
-            </a:r>
-            <a:r>
-              <a:rPr lang="en-US" sz="2000" dirty="0"/>
-              <a:t>Fast PGAS Implementation of Distributed Graph Algorithms</a:t>
-            </a:r>
-            <a:r>
-              <a:rPr lang="de-DE" sz="2000" dirty="0"/>
-              <a:t> </a:t>
-            </a:r>
-            <a:r>
-              <a:rPr lang="de-DE" sz="2000" i="1" dirty="0"/>
-              <a:t>- </a:t>
-            </a:r>
-            <a:r>
-              <a:rPr lang="de-DE" sz="2000" i="1" dirty="0" err="1"/>
-              <a:t>Guojing</a:t>
-            </a:r>
-            <a:r>
-              <a:rPr lang="de-DE" sz="2000" i="1" dirty="0"/>
-              <a:t> </a:t>
-            </a:r>
-            <a:r>
-              <a:rPr lang="de-DE" sz="2000" i="1" dirty="0" err="1"/>
-              <a:t>Cong</a:t>
-            </a:r>
-            <a:r>
-              <a:rPr lang="de-DE" sz="2000" i="1" dirty="0"/>
-              <a:t>, George </a:t>
-            </a:r>
-            <a:r>
-              <a:rPr lang="de-DE" sz="2000" i="1" dirty="0" err="1"/>
-              <a:t>Almasi</a:t>
-            </a:r>
-            <a:r>
-              <a:rPr lang="de-DE" sz="2000" i="1" dirty="0"/>
-              <a:t> und Vijay A. </a:t>
-            </a:r>
-            <a:r>
-              <a:rPr lang="de-DE" sz="2000" i="1" dirty="0" err="1"/>
-              <a:t>Saraswat</a:t>
-            </a:r>
-            <a:endParaRPr lang="en-US" sz="2000" i="1" dirty="0"/>
+            <a:r>
+              <a:rPr lang="de-DE" dirty="0" smtClean="0"/>
+              <a:t>Entwicklung von Konzepten für das Kommunikations-</a:t>
+            </a:r>
+            <a:r>
+              <a:rPr lang="de-DE" dirty="0" err="1" smtClean="0"/>
+              <a:t>Batching</a:t>
+            </a:r>
+            <a:r>
+              <a:rPr lang="de-DE" dirty="0" smtClean="0"/>
+              <a:t> in PGAS (Graph-)Applikationen</a:t>
+            </a:r>
+          </a:p>
+          <a:p>
+            <a:pPr lvl="1"/>
+            <a:r>
+              <a:rPr lang="de-DE" dirty="0" smtClean="0"/>
+              <a:t>Dabei auch zu beachten: Cache Optimierung</a:t>
+            </a:r>
+          </a:p>
+          <a:p>
+            <a:r>
+              <a:rPr lang="de-DE" dirty="0" smtClean="0"/>
+              <a:t>Element Migration &amp; Load </a:t>
+            </a:r>
+            <a:r>
+              <a:rPr lang="de-DE" dirty="0" err="1" smtClean="0"/>
+              <a:t>Balancing</a:t>
+            </a:r>
+            <a:endParaRPr lang="de-DE" dirty="0" smtClean="0"/>
+          </a:p>
+          <a:p>
+            <a:pPr lvl="1"/>
+            <a:r>
+              <a:rPr lang="de-DE" dirty="0" smtClean="0"/>
+              <a:t>Dynamisches Erkennen von Hotspots</a:t>
+            </a:r>
+          </a:p>
+          <a:p>
+            <a:pPr lvl="1"/>
+            <a:r>
+              <a:rPr lang="de-DE" dirty="0" smtClean="0"/>
+              <a:t>Verschieben von </a:t>
+            </a:r>
+            <a:r>
+              <a:rPr lang="de-DE" dirty="0" err="1" smtClean="0"/>
+              <a:t>Vertizes</a:t>
+            </a:r>
+            <a:r>
+              <a:rPr lang="de-DE" dirty="0" smtClean="0"/>
+              <a:t>/Kanten zu anderen Prozessoren/Knoten während der Laufzeit</a:t>
+            </a:r>
+          </a:p>
+          <a:p>
+            <a:r>
+              <a:rPr lang="de-DE" dirty="0" smtClean="0"/>
+              <a:t>Sozialwissenschaftliche Studien zur Programmierbarkeit</a:t>
+            </a:r>
           </a:p>
         </p:txBody>
       </p:sp>
@@ -5308,6 +5288,207 @@
                 <a:defRPr/>
               </a:pPr>
               <a:t>17</a:t>
+            </a:fld>
+            <a:endParaRPr lang="de-DE" dirty="0"/>
+          </a:p>
+        </p:txBody>
+      </p:sp>
+      <p:sp>
+        <p:nvSpPr>
+          <p:cNvPr id="5" name="Fußzeilenplatzhalter 4"/>
+          <p:cNvSpPr>
+            <a:spLocks noGrp="1"/>
+          </p:cNvSpPr>
+          <p:nvPr>
+            <p:ph type="ftr" sz="quarter" idx="3"/>
+          </p:nvPr>
+        </p:nvSpPr>
+        <p:spPr/>
+        <p:txBody>
+          <a:bodyPr/>
+          <a:lstStyle/>
+          <a:p>
+            <a:r>
+              <a:rPr lang="en-US" smtClean="0"/>
+              <a:t>Masterarbeit "Graph Concepts for the DASH C++ Library"</a:t>
+            </a:r>
+            <a:endParaRPr lang="de-DE" dirty="0"/>
+          </a:p>
+        </p:txBody>
+      </p:sp>
+    </p:spTree>
+    <p:extLst>
+      <p:ext uri="{BB962C8B-B14F-4D97-AF65-F5344CB8AC3E}">
+        <p14:creationId xmlns:p14="http://schemas.microsoft.com/office/powerpoint/2010/main" val="1903541278"/>
+      </p:ext>
+    </p:extLst>
+  </p:cSld>
+  <p:clrMapOvr>
+    <a:masterClrMapping/>
+  </p:clrMapOvr>
+  <p:transition spd="med"/>
+</p:sld>
+</file>
+
+<file path=ppt/slides/slide18.xml><?xml version="1.0" encoding="utf-8"?>
+<p:sld xmlns:a="http://schemas.openxmlformats.org/drawingml/2006/main" xmlns:r="http://schemas.openxmlformats.org/officeDocument/2006/relationships" xmlns:p="http://schemas.openxmlformats.org/presentationml/2006/main">
+  <p:cSld>
+    <p:spTree>
+      <p:nvGrpSpPr>
+        <p:cNvPr id="1" name=""/>
+        <p:cNvGrpSpPr/>
+        <p:nvPr/>
+      </p:nvGrpSpPr>
+      <p:grpSpPr>
+        <a:xfrm>
+          <a:off x="0" y="0"/>
+          <a:ext cx="0" cy="0"/>
+          <a:chOff x="0" y="0"/>
+          <a:chExt cx="0" cy="0"/>
+        </a:xfrm>
+      </p:grpSpPr>
+      <p:sp>
+        <p:nvSpPr>
+          <p:cNvPr id="2" name="Titel 1"/>
+          <p:cNvSpPr>
+            <a:spLocks noGrp="1"/>
+          </p:cNvSpPr>
+          <p:nvPr>
+            <p:ph type="title"/>
+          </p:nvPr>
+        </p:nvSpPr>
+        <p:spPr/>
+        <p:txBody>
+          <a:bodyPr/>
+          <a:lstStyle/>
+          <a:p>
+            <a:r>
+              <a:rPr lang="de-DE" dirty="0"/>
+              <a:t>Quellen</a:t>
+            </a:r>
+          </a:p>
+        </p:txBody>
+      </p:sp>
+      <p:sp>
+        <p:nvSpPr>
+          <p:cNvPr id="3" name="Inhaltsplatzhalter 2"/>
+          <p:cNvSpPr>
+            <a:spLocks noGrp="1"/>
+          </p:cNvSpPr>
+          <p:nvPr>
+            <p:ph idx="1"/>
+          </p:nvPr>
+        </p:nvSpPr>
+        <p:spPr/>
+        <p:txBody>
+          <a:bodyPr/>
+          <a:lstStyle/>
+          <a:p>
+            <a:pPr marL="0" indent="0">
+              <a:spcAft>
+                <a:spcPts val="1800"/>
+              </a:spcAft>
+              <a:buNone/>
+            </a:pPr>
+            <a:r>
+              <a:rPr lang="de-DE" sz="2000" dirty="0"/>
+              <a:t>[1] </a:t>
+            </a:r>
+            <a:r>
+              <a:rPr lang="de-DE" sz="2000" dirty="0">
+                <a:hlinkClick r:id="rId2"/>
+              </a:rPr>
+              <a:t>http://en.cppreference.com/w/cpp/concept/Container</a:t>
+            </a:r>
+            <a:endParaRPr lang="de-DE" sz="2000" dirty="0"/>
+          </a:p>
+          <a:p>
+            <a:pPr marL="0" indent="0">
+              <a:spcAft>
+                <a:spcPts val="1800"/>
+              </a:spcAft>
+              <a:buNone/>
+            </a:pPr>
+            <a:r>
+              <a:rPr lang="de-DE" sz="2000" dirty="0" smtClean="0"/>
+              <a:t>[</a:t>
+            </a:r>
+            <a:r>
+              <a:rPr lang="de-DE" sz="2000" dirty="0"/>
+              <a:t>2</a:t>
+            </a:r>
+            <a:r>
+              <a:rPr lang="de-DE" sz="2000" dirty="0" smtClean="0"/>
+              <a:t>] </a:t>
+            </a:r>
+            <a:r>
+              <a:rPr lang="en-US" sz="2000" dirty="0"/>
+              <a:t>Fast PGAS Implementation of Distributed Graph Algorithms</a:t>
+            </a:r>
+            <a:r>
+              <a:rPr lang="de-DE" sz="2000" dirty="0"/>
+              <a:t> </a:t>
+            </a:r>
+            <a:r>
+              <a:rPr lang="de-DE" sz="2000" i="1" dirty="0"/>
+              <a:t>- </a:t>
+            </a:r>
+            <a:r>
+              <a:rPr lang="de-DE" sz="2000" i="1" dirty="0" err="1"/>
+              <a:t>Guojing</a:t>
+            </a:r>
+            <a:r>
+              <a:rPr lang="de-DE" sz="2000" i="1" dirty="0"/>
+              <a:t> </a:t>
+            </a:r>
+            <a:r>
+              <a:rPr lang="de-DE" sz="2000" i="1" dirty="0" err="1"/>
+              <a:t>Cong</a:t>
+            </a:r>
+            <a:r>
+              <a:rPr lang="de-DE" sz="2000" i="1" dirty="0"/>
+              <a:t>, George </a:t>
+            </a:r>
+            <a:r>
+              <a:rPr lang="de-DE" sz="2000" i="1" dirty="0" err="1"/>
+              <a:t>Almasi</a:t>
+            </a:r>
+            <a:r>
+              <a:rPr lang="de-DE" sz="2000" i="1" dirty="0"/>
+              <a:t> und Vijay A. </a:t>
+            </a:r>
+            <a:r>
+              <a:rPr lang="de-DE" sz="2000" i="1" dirty="0" err="1"/>
+              <a:t>Saraswat</a:t>
+            </a:r>
+            <a:endParaRPr lang="en-US" sz="2000" i="1" dirty="0"/>
+          </a:p>
+        </p:txBody>
+      </p:sp>
+      <p:sp>
+        <p:nvSpPr>
+          <p:cNvPr id="4" name="Foliennummernplatzhalter 3"/>
+          <p:cNvSpPr>
+            <a:spLocks noGrp="1"/>
+          </p:cNvSpPr>
+          <p:nvPr>
+            <p:ph type="sldNum" sz="quarter" idx="4"/>
+          </p:nvPr>
+        </p:nvSpPr>
+        <p:spPr/>
+        <p:txBody>
+          <a:bodyPr/>
+          <a:lstStyle/>
+          <a:p>
+            <a:pPr>
+              <a:defRPr/>
+            </a:pPr>
+            <a:fld id="{70BFFA52-4234-45F6-B1A6-074E24FF43A2}" type="slidenum">
+              <a:rPr lang="de-DE" smtClean="0"/>
+              <a:pPr>
+                <a:defRPr/>
+              </a:pPr>
+              <a:t>18</a:t>
             </a:fld>
             <a:endParaRPr lang="de-DE" dirty="0"/>
           </a:p>
@@ -6391,15 +6572,7 @@
             </a:r>
             <a:r>
               <a:rPr lang="en-US" sz="1600" dirty="0"/>
-              <a:t> </a:t>
-            </a:r>
-            <a:r>
-              <a:rPr lang="en-US" sz="1600" dirty="0"/>
-              <a:t>Container</a:t>
-            </a:r>
-            <a:r>
-              <a:rPr lang="en-US" sz="1600" dirty="0"/>
-              <a:t> is an object used to store other objects and taking care of the management of the memory used by the objects it contains</a:t>
+              <a:t> Container is an object used to store other objects and taking care of the management of the memory used by the objects it contains</a:t>
             </a:r>
             <a:r>
               <a:rPr lang="en-US" sz="1600" dirty="0" smtClean="0"/>

</xml_diff>